<commit_message>
Fix typo for education cert and pptx, use more character encoding for safer cross-browser compat
</commit_message>
<xml_diff>
--- a/media/TherapistFinder_finalPresentation_ericwa.pptx
+++ b/media/TherapistFinder_finalPresentation_ericwa.pptx
@@ -3834,7 +3834,7 @@
           <a:p>
             <a:fld id="{B0448798-2936-254A-B70B-47A8E5140F6C}" type="datetimeFigureOut">
               <a:rPr lang="en-US" smtClean="0"/>
-              <a:t>6/28/23</a:t>
+              <a:t>7/8/23</a:t>
             </a:fld>
             <a:endParaRPr lang="en-US"/>
           </a:p>
@@ -4032,7 +4032,7 @@
           <a:p>
             <a:fld id="{B0448798-2936-254A-B70B-47A8E5140F6C}" type="datetimeFigureOut">
               <a:rPr lang="en-US" smtClean="0"/>
-              <a:t>6/28/23</a:t>
+              <a:t>7/8/23</a:t>
             </a:fld>
             <a:endParaRPr lang="en-US"/>
           </a:p>
@@ -4240,7 +4240,7 @@
           <a:p>
             <a:fld id="{B0448798-2936-254A-B70B-47A8E5140F6C}" type="datetimeFigureOut">
               <a:rPr lang="en-US" smtClean="0"/>
-              <a:t>6/28/23</a:t>
+              <a:t>7/8/23</a:t>
             </a:fld>
             <a:endParaRPr lang="en-US"/>
           </a:p>
@@ -4438,7 +4438,7 @@
           <a:p>
             <a:fld id="{B0448798-2936-254A-B70B-47A8E5140F6C}" type="datetimeFigureOut">
               <a:rPr lang="en-US" smtClean="0"/>
-              <a:t>6/28/23</a:t>
+              <a:t>7/8/23</a:t>
             </a:fld>
             <a:endParaRPr lang="en-US"/>
           </a:p>
@@ -4713,7 +4713,7 @@
           <a:p>
             <a:fld id="{B0448798-2936-254A-B70B-47A8E5140F6C}" type="datetimeFigureOut">
               <a:rPr lang="en-US" smtClean="0"/>
-              <a:t>6/28/23</a:t>
+              <a:t>7/8/23</a:t>
             </a:fld>
             <a:endParaRPr lang="en-US"/>
           </a:p>
@@ -4978,7 +4978,7 @@
           <a:p>
             <a:fld id="{B0448798-2936-254A-B70B-47A8E5140F6C}" type="datetimeFigureOut">
               <a:rPr lang="en-US" smtClean="0"/>
-              <a:t>6/28/23</a:t>
+              <a:t>7/8/23</a:t>
             </a:fld>
             <a:endParaRPr lang="en-US"/>
           </a:p>
@@ -5390,7 +5390,7 @@
           <a:p>
             <a:fld id="{B0448798-2936-254A-B70B-47A8E5140F6C}" type="datetimeFigureOut">
               <a:rPr lang="en-US" smtClean="0"/>
-              <a:t>6/28/23</a:t>
+              <a:t>7/8/23</a:t>
             </a:fld>
             <a:endParaRPr lang="en-US"/>
           </a:p>
@@ -5531,7 +5531,7 @@
           <a:p>
             <a:fld id="{B0448798-2936-254A-B70B-47A8E5140F6C}" type="datetimeFigureOut">
               <a:rPr lang="en-US" smtClean="0"/>
-              <a:t>6/28/23</a:t>
+              <a:t>7/8/23</a:t>
             </a:fld>
             <a:endParaRPr lang="en-US"/>
           </a:p>
@@ -5644,7 +5644,7 @@
           <a:p>
             <a:fld id="{B0448798-2936-254A-B70B-47A8E5140F6C}" type="datetimeFigureOut">
               <a:rPr lang="en-US" smtClean="0"/>
-              <a:t>6/28/23</a:t>
+              <a:t>7/8/23</a:t>
             </a:fld>
             <a:endParaRPr lang="en-US"/>
           </a:p>
@@ -5955,7 +5955,7 @@
           <a:p>
             <a:fld id="{B0448798-2936-254A-B70B-47A8E5140F6C}" type="datetimeFigureOut">
               <a:rPr lang="en-US" smtClean="0"/>
-              <a:t>6/28/23</a:t>
+              <a:t>7/8/23</a:t>
             </a:fld>
             <a:endParaRPr lang="en-US"/>
           </a:p>
@@ -6243,7 +6243,7 @@
           <a:p>
             <a:fld id="{B0448798-2936-254A-B70B-47A8E5140F6C}" type="datetimeFigureOut">
               <a:rPr lang="en-US" smtClean="0"/>
-              <a:t>6/28/23</a:t>
+              <a:t>7/8/23</a:t>
             </a:fld>
             <a:endParaRPr lang="en-US"/>
           </a:p>
@@ -6484,7 +6484,7 @@
           <a:p>
             <a:fld id="{B0448798-2936-254A-B70B-47A8E5140F6C}" type="datetimeFigureOut">
               <a:rPr lang="en-US" smtClean="0"/>
-              <a:t>6/28/23</a:t>
+              <a:t>7/8/23</a:t>
             </a:fld>
             <a:endParaRPr lang="en-US"/>
           </a:p>
@@ -6944,8 +6944,12 @@
           </a:p>
           <a:p>
             <a:r>
+              <a:rPr lang="en-US"/>
+              <a:t>April </a:t>
+            </a:r>
+            <a:r>
               <a:rPr lang="en-US" dirty="0"/>
-              <a:t>March 13, 2022</a:t>
+              <a:t>13, 2022</a:t>
             </a:r>
             <a:br>
               <a:rPr lang="en-US" dirty="0"/>

</xml_diff>